<commit_message>
Add description of AUTH KEY handling
</commit_message>
<xml_diff>
--- a/SCTP_DTLS_REQ-matching-dtls-over-sctp-tuexen.pptx
+++ b/SCTP_DTLS_REQ-matching-dtls-over-sctp-tuexen.pptx
@@ -5,15 +5,16 @@
     <p:sldMasterId id="2147483648" r:id="rId1"/>
   </p:sldMasterIdLst>
   <p:notesMasterIdLst>
-    <p:notesMasterId r:id="rId8"/>
+    <p:notesMasterId r:id="rId9"/>
   </p:notesMasterIdLst>
   <p:sldIdLst>
     <p:sldId id="256" r:id="rId2"/>
     <p:sldId id="262" r:id="rId3"/>
-    <p:sldId id="258" r:id="rId4"/>
-    <p:sldId id="259" r:id="rId5"/>
-    <p:sldId id="260" r:id="rId6"/>
-    <p:sldId id="261" r:id="rId7"/>
+    <p:sldId id="263" r:id="rId4"/>
+    <p:sldId id="258" r:id="rId5"/>
+    <p:sldId id="259" r:id="rId6"/>
+    <p:sldId id="260" r:id="rId7"/>
+    <p:sldId id="261" r:id="rId8"/>
   </p:sldIdLst>
   <p:sldSz cx="12192000" cy="6858000"/>
   <p:notesSz cx="6858000" cy="9144000"/>
@@ -202,7 +203,7 @@
           <a:p>
             <a:fld id="{108AD09B-7AB8-CC42-A1BA-7C68369AC918}" type="datetimeFigureOut">
               <a:rPr lang="en-US" smtClean="0"/>
-              <a:t>12/8/23</a:t>
+              <a:t>12/14/23</a:t>
             </a:fld>
             <a:endParaRPr lang="en-US"/>
           </a:p>
@@ -616,7 +617,7 @@
           <a:p>
             <a:fld id="{A8F7BD6E-364A-514B-905D-15DBF3E67648}" type="datetime1">
               <a:rPr lang="en-US" smtClean="0"/>
-              <a:t>12/8/23</a:t>
+              <a:t>12/14/23</a:t>
             </a:fld>
             <a:endParaRPr lang="en-US"/>
           </a:p>
@@ -814,7 +815,7 @@
           <a:p>
             <a:fld id="{F61C2FBE-B8D6-D547-9282-9EC77743BC0A}" type="datetime1">
               <a:rPr lang="en-US" smtClean="0"/>
-              <a:t>12/8/23</a:t>
+              <a:t>12/14/23</a:t>
             </a:fld>
             <a:endParaRPr lang="en-US"/>
           </a:p>
@@ -1022,7 +1023,7 @@
           <a:p>
             <a:fld id="{C531A4A5-E0CC-6A44-8D5B-7470DEE9150D}" type="datetime1">
               <a:rPr lang="en-US" smtClean="0"/>
-              <a:t>12/8/23</a:t>
+              <a:t>12/14/23</a:t>
             </a:fld>
             <a:endParaRPr lang="en-US"/>
           </a:p>
@@ -1220,7 +1221,7 @@
           <a:p>
             <a:fld id="{0FD05AA0-7A0A-A240-95B0-41C4FC7FEF3F}" type="datetime1">
               <a:rPr lang="en-US" smtClean="0"/>
-              <a:t>12/8/23</a:t>
+              <a:t>12/14/23</a:t>
             </a:fld>
             <a:endParaRPr lang="en-US"/>
           </a:p>
@@ -1495,7 +1496,7 @@
           <a:p>
             <a:fld id="{492F5F67-E4E1-0B46-A541-0286580506DC}" type="datetime1">
               <a:rPr lang="en-US" smtClean="0"/>
-              <a:t>12/8/23</a:t>
+              <a:t>12/14/23</a:t>
             </a:fld>
             <a:endParaRPr lang="en-US"/>
           </a:p>
@@ -1760,7 +1761,7 @@
           <a:p>
             <a:fld id="{CD6E3338-B931-A843-9726-3D4933BBE2B6}" type="datetime1">
               <a:rPr lang="en-US" smtClean="0"/>
-              <a:t>12/8/23</a:t>
+              <a:t>12/14/23</a:t>
             </a:fld>
             <a:endParaRPr lang="en-US"/>
           </a:p>
@@ -2172,7 +2173,7 @@
           <a:p>
             <a:fld id="{998F852E-6523-104E-943C-AD0A8BADDFF7}" type="datetime1">
               <a:rPr lang="en-US" smtClean="0"/>
-              <a:t>12/8/23</a:t>
+              <a:t>12/14/23</a:t>
             </a:fld>
             <a:endParaRPr lang="en-US"/>
           </a:p>
@@ -2313,7 +2314,7 @@
           <a:p>
             <a:fld id="{00715B09-F454-1B43-BA14-0C163C35D17B}" type="datetime1">
               <a:rPr lang="en-US" smtClean="0"/>
-              <a:t>12/8/23</a:t>
+              <a:t>12/14/23</a:t>
             </a:fld>
             <a:endParaRPr lang="en-US"/>
           </a:p>
@@ -2426,7 +2427,7 @@
           <a:p>
             <a:fld id="{45D3E245-F198-854E-AE1F-11D9862087BE}" type="datetime1">
               <a:rPr lang="en-US" smtClean="0"/>
-              <a:t>12/8/23</a:t>
+              <a:t>12/14/23</a:t>
             </a:fld>
             <a:endParaRPr lang="en-US"/>
           </a:p>
@@ -2737,7 +2738,7 @@
           <a:p>
             <a:fld id="{1CDA9BB8-81E0-C14F-B5A7-21E310CC6BEA}" type="datetime1">
               <a:rPr lang="en-US" smtClean="0"/>
-              <a:t>12/8/23</a:t>
+              <a:t>12/14/23</a:t>
             </a:fld>
             <a:endParaRPr lang="en-US"/>
           </a:p>
@@ -3025,7 +3026,7 @@
           <a:p>
             <a:fld id="{35BD4846-0B22-E244-9BD2-C2A2A852C121}" type="datetime1">
               <a:rPr lang="en-US" smtClean="0"/>
-              <a:t>12/8/23</a:t>
+              <a:t>12/14/23</a:t>
             </a:fld>
             <a:endParaRPr lang="en-US"/>
           </a:p>
@@ -3266,7 +3267,7 @@
           <a:p>
             <a:fld id="{C37BE4AB-D615-A94C-AEE2-AC91B9864A50}" type="datetime1">
               <a:rPr lang="en-US" smtClean="0"/>
-              <a:t>12/8/23</a:t>
+              <a:t>12/14/23</a:t>
             </a:fld>
             <a:endParaRPr lang="en-US"/>
           </a:p>
@@ -3951,7 +3952,7 @@
           <p:cNvPr id="2" name="Title 1">
             <a:extLst>
               <a:ext uri="{FF2B5EF4-FFF2-40B4-BE49-F238E27FC236}">
-                <a16:creationId xmlns:a16="http://schemas.microsoft.com/office/drawing/2014/main" id="{564DDCBF-3490-DB5D-1F0D-569D609B9348}"/>
+                <a16:creationId xmlns:a16="http://schemas.microsoft.com/office/drawing/2014/main" id="{68EB5AF0-84C8-CC87-7D6B-8A26E3793587}"/>
               </a:ext>
             </a:extLst>
           </p:cNvPr>
@@ -3969,7 +3970,7 @@
           <a:p>
             <a:r>
               <a:rPr lang="en-US" dirty="0"/>
-              <a:t>Functional Requirements for SCTP</a:t>
+              <a:t>SCTP AUTH Key Handling</a:t>
             </a:r>
           </a:p>
         </p:txBody>
@@ -3979,7 +3980,7 @@
           <p:cNvPr id="3" name="Content Placeholder 2">
             <a:extLst>
               <a:ext uri="{FF2B5EF4-FFF2-40B4-BE49-F238E27FC236}">
-                <a16:creationId xmlns:a16="http://schemas.microsoft.com/office/drawing/2014/main" id="{B2B83F0E-9D61-AE57-DB66-1C6112D14E26}"/>
+                <a16:creationId xmlns:a16="http://schemas.microsoft.com/office/drawing/2014/main" id="{F4678ED3-3385-5ECF-FAEC-55975F26589E}"/>
               </a:ext>
             </a:extLst>
           </p:cNvPr>
@@ -3992,112 +3993,78 @@
         </p:nvSpPr>
         <p:spPr/>
         <p:txBody>
-          <a:bodyPr>
-            <a:normAutofit lnSpcReduction="10000"/>
-          </a:bodyPr>
+          <a:bodyPr/>
           <a:lstStyle/>
           <a:p>
             <a:r>
               <a:rPr lang="en-US" dirty="0"/>
-              <a:t>Features from the base specification</a:t>
+              <a:t>Sender side</a:t>
             </a:r>
           </a:p>
           <a:p>
             <a:pPr lvl="1"/>
             <a:r>
               <a:rPr lang="en-US" dirty="0"/>
-              <a:t>Ordered reliable transmission of user messages (MUST)</a:t>
-            </a:r>
-            <a:br>
+              <a:t>Before sending </a:t>
+            </a:r>
+            <a:r>
+              <a:rPr lang="en-US" dirty="0" err="1"/>
+              <a:t>ExtendedKeyUpdate</a:t>
+            </a:r>
+            <a:r>
               <a:rPr lang="en-US" dirty="0"/>
-            </a:br>
-            <a:r>
-              <a:rPr lang="en-US" dirty="0">
-                <a:solidFill>
-                  <a:srgbClr val="FF0000"/>
-                </a:solidFill>
-              </a:rPr>
-              <a:t>Yes, using PPID based fragmentation</a:t>
+              <a:t> for switching to epoch n+1, ensure that all messages from epoch n-1 have been </a:t>
+            </a:r>
+            <a:r>
+              <a:rPr lang="en-US" dirty="0" err="1"/>
+              <a:t>acked</a:t>
+            </a:r>
+            <a:r>
+              <a:rPr lang="en-US" dirty="0"/>
+              <a:t> in a non-</a:t>
+            </a:r>
+            <a:r>
+              <a:rPr lang="en-US" dirty="0" err="1"/>
+              <a:t>renegable</a:t>
+            </a:r>
+            <a:r>
+              <a:rPr lang="en-US" dirty="0"/>
+              <a:t> way.</a:t>
             </a:r>
           </a:p>
           <a:p>
             <a:pPr lvl="1"/>
             <a:r>
               <a:rPr lang="en-US" dirty="0"/>
-              <a:t>Multihoming as specified in RFC 6260 (MUST)</a:t>
-            </a:r>
-            <a:br>
+              <a:t>This can be done by using the SCTP_AUTHENTICATION_EVENT (SCTP_AUTH_FREE_KEY) event.</a:t>
+            </a:r>
+          </a:p>
+          <a:p>
+            <a:r>
               <a:rPr lang="en-US" dirty="0"/>
-            </a:br>
-            <a:r>
-              <a:rPr lang="en-US" dirty="0">
-                <a:solidFill>
-                  <a:srgbClr val="FF0000"/>
-                </a:solidFill>
-              </a:rPr>
-              <a:t>Yes.</a:t>
-            </a:r>
-            <a:endParaRPr lang="en-US" dirty="0"/>
+              <a:t>Receiver side</a:t>
+            </a:r>
           </a:p>
           <a:p>
             <a:pPr lvl="1"/>
             <a:r>
               <a:rPr lang="en-US" dirty="0"/>
-              <a:t>Dynamic address reconfiguration as specified in RFC 5061 (MAY)</a:t>
-            </a:r>
-            <a:br>
+              <a:t>Before sending  </a:t>
+            </a:r>
+            <a:r>
+              <a:rPr lang="en-US" dirty="0" err="1"/>
+              <a:t>ExtendedKeyUpdate</a:t>
+            </a:r>
+            <a:r>
               <a:rPr lang="en-US" dirty="0"/>
-            </a:br>
-            <a:r>
-              <a:rPr lang="en-US" dirty="0">
-                <a:solidFill>
-                  <a:srgbClr val="FF0000"/>
-                </a:solidFill>
-              </a:rPr>
-              <a:t>Yes.</a:t>
+              <a:t> in response, ensure that all messages from epoch n-1 have been processed.</a:t>
             </a:r>
           </a:p>
           <a:p>
             <a:pPr lvl="1"/>
             <a:r>
               <a:rPr lang="en-US" dirty="0"/>
-              <a:t>Restart procedure (MUST)</a:t>
-            </a:r>
-            <a:br>
-              <a:rPr lang="en-US" dirty="0"/>
-            </a:br>
-            <a:r>
-              <a:rPr lang="en-US" dirty="0">
-                <a:solidFill>
-                  <a:srgbClr val="FF0000"/>
-                </a:solidFill>
-              </a:rPr>
-              <a:t>Yes.</a:t>
-            </a:r>
-            <a:endParaRPr lang="en-US" dirty="0"/>
-          </a:p>
-          <a:p>
-            <a:r>
-              <a:rPr lang="en-US" dirty="0"/>
-              <a:t>Parametrization</a:t>
-            </a:r>
-          </a:p>
-          <a:p>
-            <a:pPr lvl="1"/>
-            <a:r>
-              <a:rPr lang="en-US" dirty="0"/>
-              <a:t>At least two SCTP streams available to the application (MUST)</a:t>
-            </a:r>
-            <a:br>
-              <a:rPr lang="en-US" dirty="0"/>
-            </a:br>
-            <a:r>
-              <a:rPr lang="en-US" dirty="0">
-                <a:solidFill>
-                  <a:srgbClr val="FF0000"/>
-                </a:solidFill>
-              </a:rPr>
-              <a:t>Yes.</a:t>
+              <a:t>This can be done by using an extension of the SCTP_AUTHENTICATION_EVENT event. It would also require that SCTP user messages use a single SCTP AUTH key.</a:t>
             </a:r>
           </a:p>
         </p:txBody>
@@ -4107,7 +4074,7 @@
           <p:cNvPr id="4" name="Slide Number Placeholder 3">
             <a:extLst>
               <a:ext uri="{FF2B5EF4-FFF2-40B4-BE49-F238E27FC236}">
-                <a16:creationId xmlns:a16="http://schemas.microsoft.com/office/drawing/2014/main" id="{D81E86BC-ECD1-EC8C-3E25-2A126B35D42F}"/>
+                <a16:creationId xmlns:a16="http://schemas.microsoft.com/office/drawing/2014/main" id="{5918409C-9F87-0301-C4CE-6E7F4AA4484A}"/>
               </a:ext>
             </a:extLst>
           </p:cNvPr>
@@ -4134,7 +4101,7 @@
     </p:spTree>
     <p:extLst>
       <p:ext uri="{BB962C8B-B14F-4D97-AF65-F5344CB8AC3E}">
-        <p14:creationId xmlns:p14="http://schemas.microsoft.com/office/powerpoint/2010/main" val="462022126"/>
+        <p14:creationId xmlns:p14="http://schemas.microsoft.com/office/powerpoint/2010/main" val="2997925229"/>
       </p:ext>
     </p:extLst>
   </p:cSld>
@@ -4166,7 +4133,7 @@
           <p:cNvPr id="2" name="Title 1">
             <a:extLst>
               <a:ext uri="{FF2B5EF4-FFF2-40B4-BE49-F238E27FC236}">
-                <a16:creationId xmlns:a16="http://schemas.microsoft.com/office/drawing/2014/main" id="{21F0E716-C137-9156-0322-229C3EDBCFBE}"/>
+                <a16:creationId xmlns:a16="http://schemas.microsoft.com/office/drawing/2014/main" id="{564DDCBF-3490-DB5D-1F0D-569D609B9348}"/>
               </a:ext>
             </a:extLst>
           </p:cNvPr>
@@ -4184,7 +4151,7 @@
           <a:p>
             <a:r>
               <a:rPr lang="en-US" dirty="0"/>
-              <a:t>Implementation Considerations for SCTP</a:t>
+              <a:t>Functional Requirements for SCTP</a:t>
             </a:r>
           </a:p>
         </p:txBody>
@@ -4194,7 +4161,7 @@
           <p:cNvPr id="3" name="Content Placeholder 2">
             <a:extLst>
               <a:ext uri="{FF2B5EF4-FFF2-40B4-BE49-F238E27FC236}">
-                <a16:creationId xmlns:a16="http://schemas.microsoft.com/office/drawing/2014/main" id="{72FEC545-62E9-15BE-6123-69BF4A2396D7}"/>
+                <a16:creationId xmlns:a16="http://schemas.microsoft.com/office/drawing/2014/main" id="{B2B83F0E-9D61-AE57-DB66-1C6112D14E26}"/>
               </a:ext>
             </a:extLst>
           </p:cNvPr>
@@ -4208,137 +4175,20 @@
         <p:spPr/>
         <p:txBody>
           <a:bodyPr>
-            <a:normAutofit fontScale="70000" lnSpcReduction="20000"/>
+            <a:normAutofit lnSpcReduction="10000"/>
           </a:bodyPr>
           <a:lstStyle/>
           <a:p>
             <a:r>
-              <a:rPr lang="en-US" b="0" i="0" u="none" strike="noStrike" dirty="0">
-                <a:solidFill>
-                  <a:srgbClr val="222222"/>
-                </a:solidFill>
-                <a:effectLst/>
-              </a:rPr>
-              <a:t>SCTP_EXPLICT_EOR (SHOULD)</a:t>
-            </a:r>
-            <a:br>
-              <a:rPr lang="en-US" b="0" i="0" u="none" strike="noStrike" dirty="0">
-                <a:solidFill>
-                  <a:srgbClr val="222222"/>
-                </a:solidFill>
-                <a:effectLst/>
-              </a:rPr>
-            </a:br>
-            <a:r>
-              <a:rPr lang="en-US" b="0" i="0" u="none" strike="noStrike" dirty="0">
-                <a:solidFill>
-                  <a:srgbClr val="FF0000"/>
-                </a:solidFill>
-                <a:effectLst/>
-              </a:rPr>
-              <a:t>Not needed for PPID-based fragmentation.</a:t>
-            </a:r>
-            <a:endParaRPr lang="en-US" b="0" i="0" u="none" strike="noStrike" dirty="0">
-              <a:solidFill>
-                <a:srgbClr val="222222"/>
-              </a:solidFill>
-              <a:effectLst/>
-            </a:endParaRPr>
-          </a:p>
-          <a:p>
-            <a:r>
-              <a:rPr lang="en-US" dirty="0">
-                <a:solidFill>
-                  <a:srgbClr val="222222"/>
-                </a:solidFill>
-              </a:rPr>
-              <a:t>Partial delivery (MUST)</a:t>
-            </a:r>
-            <a:br>
-              <a:rPr lang="en-US" dirty="0">
-                <a:solidFill>
-                  <a:srgbClr val="FF0000"/>
-                </a:solidFill>
-              </a:rPr>
-            </a:br>
-            <a:r>
-              <a:rPr lang="en-US" dirty="0">
-                <a:solidFill>
-                  <a:srgbClr val="FF0000"/>
-                </a:solidFill>
-              </a:rPr>
-              <a:t>Yes, but not needed at the SCTP layer. Needs to be done above DTLS.</a:t>
-            </a:r>
-            <a:endParaRPr lang="en-US" b="0" i="0" u="none" strike="noStrike" dirty="0">
-              <a:solidFill>
-                <a:srgbClr val="FF0000"/>
-              </a:solidFill>
-              <a:effectLst/>
-            </a:endParaRPr>
-          </a:p>
-          <a:p>
-            <a:r>
-              <a:rPr lang="en-US" b="0" i="0" u="none" strike="noStrike" dirty="0">
-                <a:solidFill>
-                  <a:srgbClr val="222222"/>
-                </a:solidFill>
-                <a:effectLst/>
-              </a:rPr>
-              <a:t>User message sizes must not be limited by a protocol implementation</a:t>
-            </a:r>
-            <a:br>
-              <a:rPr lang="en-US" b="0" i="0" u="none" strike="noStrike" dirty="0">
-                <a:solidFill>
-                  <a:srgbClr val="222222"/>
-                </a:solidFill>
-                <a:effectLst/>
-              </a:rPr>
-            </a:br>
-            <a:r>
-              <a:rPr lang="en-US" b="0" i="0" u="none" strike="noStrike" dirty="0">
-                <a:solidFill>
-                  <a:srgbClr val="FF0000"/>
-                </a:solidFill>
-                <a:effectLst/>
-              </a:rPr>
-              <a:t>Yes, for ordered reliable messages.</a:t>
-            </a:r>
-            <a:endParaRPr lang="en-US" b="0" i="0" u="none" strike="noStrike" dirty="0">
-              <a:solidFill>
-                <a:srgbClr val="222222"/>
-              </a:solidFill>
-              <a:effectLst/>
-            </a:endParaRPr>
-          </a:p>
-          <a:p>
-            <a:r>
-              <a:rPr lang="en-US" dirty="0">
-                <a:effectLst/>
-              </a:rPr>
-              <a:t>It is implementable using an SCTP userland stack (MUST)</a:t>
-            </a:r>
-            <a:br>
-              <a:rPr lang="en-US" dirty="0">
-                <a:effectLst/>
-              </a:rPr>
-            </a:br>
-            <a:r>
-              <a:rPr lang="en-US" dirty="0">
-                <a:solidFill>
-                  <a:srgbClr val="FF0000"/>
-                </a:solidFill>
-                <a:effectLst/>
-              </a:rPr>
-              <a:t>Yes.</a:t>
-            </a:r>
-            <a:endParaRPr lang="en-US" dirty="0">
-              <a:effectLst/>
-            </a:endParaRPr>
-          </a:p>
-          <a:p>
-            <a:r>
               <a:rPr lang="en-US" dirty="0"/>
-              <a:t>It is implementable using an SCTP kernel stack (MUST)</a:t>
+              <a:t>Features from the base specification</a:t>
+            </a:r>
+          </a:p>
+          <a:p>
+            <a:pPr lvl="1"/>
+            <a:r>
+              <a:rPr lang="en-US" dirty="0"/>
+              <a:t>Ordered reliable transmission of user messages (MUST)</a:t>
             </a:r>
             <a:br>
               <a:rPr lang="en-US" dirty="0"/>
@@ -4349,13 +4199,14 @@
                   <a:srgbClr val="FF0000"/>
                 </a:solidFill>
               </a:rPr>
-              <a:t>Yes.</a:t>
-            </a:r>
-          </a:p>
-          <a:p>
+              <a:t>Yes, using PPID based fragmentation</a:t>
+            </a:r>
+          </a:p>
+          <a:p>
+            <a:pPr lvl="1"/>
             <a:r>
               <a:rPr lang="en-US" dirty="0"/>
-              <a:t>It is implementable using an open source (not referring to licensing) SCTP stack (SHOULD)</a:t>
+              <a:t>Multihoming as specified in RFC 6260 (MUST)</a:t>
             </a:r>
             <a:br>
               <a:rPr lang="en-US" dirty="0"/>
@@ -4368,27 +4219,13 @@
               </a:rPr>
               <a:t>Yes.</a:t>
             </a:r>
-          </a:p>
-          <a:p>
-            <a:r>
-              <a:rPr lang="en-US" dirty="0">
-                <a:effectLst/>
-              </a:rPr>
-              <a:t>TBD: </a:t>
-            </a:r>
+            <a:endParaRPr lang="en-US" dirty="0"/>
+          </a:p>
+          <a:p>
+            <a:pPr lvl="1"/>
             <a:r>
               <a:rPr lang="en-US" dirty="0"/>
-              <a:t>l</a:t>
-            </a:r>
-            <a:r>
-              <a:rPr lang="en-US" dirty="0">
-                <a:effectLst/>
-              </a:rPr>
-              <a:t>icensin</a:t>
-            </a:r>
-            <a:r>
-              <a:rPr lang="en-US" dirty="0"/>
-              <a:t>g</a:t>
+              <a:t>Dynamic address reconfiguration as specified in RFC 5061 (MAY)</a:t>
             </a:r>
             <a:br>
               <a:rPr lang="en-US" dirty="0"/>
@@ -4399,11 +4236,51 @@
                   <a:srgbClr val="FF0000"/>
                 </a:solidFill>
               </a:rPr>
-              <a:t>As far as authors are affected: no IPR.</a:t>
-            </a:r>
-            <a:endParaRPr lang="en-US" dirty="0">
-              <a:effectLst/>
-            </a:endParaRPr>
+              <a:t>Yes.</a:t>
+            </a:r>
+          </a:p>
+          <a:p>
+            <a:pPr lvl="1"/>
+            <a:r>
+              <a:rPr lang="en-US" dirty="0"/>
+              <a:t>Restart procedure (MUST)</a:t>
+            </a:r>
+            <a:br>
+              <a:rPr lang="en-US" dirty="0"/>
+            </a:br>
+            <a:r>
+              <a:rPr lang="en-US" dirty="0">
+                <a:solidFill>
+                  <a:srgbClr val="FF0000"/>
+                </a:solidFill>
+              </a:rPr>
+              <a:t>Yes.</a:t>
+            </a:r>
+            <a:endParaRPr lang="en-US" dirty="0"/>
+          </a:p>
+          <a:p>
+            <a:r>
+              <a:rPr lang="en-US" dirty="0"/>
+              <a:t>Parametrization</a:t>
+            </a:r>
+          </a:p>
+          <a:p>
+            <a:pPr lvl="1"/>
+            <a:r>
+              <a:rPr lang="en-US" dirty="0"/>
+              <a:t>At least two SCTP streams available to the application (MUST)</a:t>
+            </a:r>
+            <a:br>
+              <a:rPr lang="en-US" dirty="0"/>
+            </a:br>
+            <a:r>
+              <a:rPr lang="en-US" dirty="0">
+                <a:solidFill>
+                  <a:srgbClr val="FF0000"/>
+                </a:solidFill>
+              </a:rPr>
+              <a:t>Yes.</a:t>
+            </a:r>
           </a:p>
         </p:txBody>
       </p:sp>
@@ -4412,7 +4289,7 @@
           <p:cNvPr id="4" name="Slide Number Placeholder 3">
             <a:extLst>
               <a:ext uri="{FF2B5EF4-FFF2-40B4-BE49-F238E27FC236}">
-                <a16:creationId xmlns:a16="http://schemas.microsoft.com/office/drawing/2014/main" id="{80A73420-E304-34D9-B5E3-D70DA783626A}"/>
+                <a16:creationId xmlns:a16="http://schemas.microsoft.com/office/drawing/2014/main" id="{D81E86BC-ECD1-EC8C-3E25-2A126B35D42F}"/>
               </a:ext>
             </a:extLst>
           </p:cNvPr>
@@ -4439,7 +4316,7 @@
     </p:spTree>
     <p:extLst>
       <p:ext uri="{BB962C8B-B14F-4D97-AF65-F5344CB8AC3E}">
-        <p14:creationId xmlns:p14="http://schemas.microsoft.com/office/powerpoint/2010/main" val="211260678"/>
+        <p14:creationId xmlns:p14="http://schemas.microsoft.com/office/powerpoint/2010/main" val="462022126"/>
       </p:ext>
     </p:extLst>
   </p:cSld>
@@ -4471,7 +4348,7 @@
           <p:cNvPr id="2" name="Title 1">
             <a:extLst>
               <a:ext uri="{FF2B5EF4-FFF2-40B4-BE49-F238E27FC236}">
-                <a16:creationId xmlns:a16="http://schemas.microsoft.com/office/drawing/2014/main" id="{88BD570C-926F-7FA2-2BE6-DDC8641D81B3}"/>
+                <a16:creationId xmlns:a16="http://schemas.microsoft.com/office/drawing/2014/main" id="{21F0E716-C137-9156-0322-229C3EDBCFBE}"/>
               </a:ext>
             </a:extLst>
           </p:cNvPr>
@@ -4489,7 +4366,7 @@
           <a:p>
             <a:r>
               <a:rPr lang="en-US" dirty="0"/>
-              <a:t>Security Requirements</a:t>
+              <a:t>Implementation Considerations for SCTP</a:t>
             </a:r>
           </a:p>
         </p:txBody>
@@ -4499,7 +4376,7 @@
           <p:cNvPr id="3" name="Content Placeholder 2">
             <a:extLst>
               <a:ext uri="{FF2B5EF4-FFF2-40B4-BE49-F238E27FC236}">
-                <a16:creationId xmlns:a16="http://schemas.microsoft.com/office/drawing/2014/main" id="{99082230-7BEC-751E-A377-4F998C40A09B}"/>
+                <a16:creationId xmlns:a16="http://schemas.microsoft.com/office/drawing/2014/main" id="{72FEC545-62E9-15BE-6123-69BF4A2396D7}"/>
               </a:ext>
             </a:extLst>
           </p:cNvPr>
@@ -4513,7 +4390,7 @@
         <p:spPr/>
         <p:txBody>
           <a:bodyPr>
-            <a:normAutofit fontScale="62500" lnSpcReduction="20000"/>
+            <a:normAutofit fontScale="70000" lnSpcReduction="20000"/>
           </a:bodyPr>
           <a:lstStyle/>
           <a:p>
@@ -4523,9 +4400,8 @@
                   <a:srgbClr val="222222"/>
                 </a:solidFill>
                 <a:effectLst/>
-                <a:latin typeface="Noto Sans" panose="020B0502040504020204" pitchFamily="34" charset="0"/>
-              </a:rPr>
-              <a:t>An on-path attacker being able to replay messages, insert messages, or modify messages is considered. (MUST)</a:t>
+              </a:rPr>
+              <a:t>SCTP_EXPLICT_EOR (SHOULD)</a:t>
             </a:r>
             <a:br>
               <a:rPr lang="en-US" b="0" i="0" u="none" strike="noStrike" dirty="0">
@@ -4533,7 +4409,6 @@
                   <a:srgbClr val="222222"/>
                 </a:solidFill>
                 <a:effectLst/>
-                <a:latin typeface="Noto Sans" panose="020B0502040504020204" pitchFamily="34" charset="0"/>
               </a:rPr>
             </a:br>
             <a:r>
@@ -4542,41 +4417,56 @@
                   <a:srgbClr val="FF0000"/>
                 </a:solidFill>
                 <a:effectLst/>
-                <a:latin typeface="Noto Sans" panose="020B0502040504020204" pitchFamily="34" charset="0"/>
-              </a:rPr>
-              <a:t>Yes.</a:t>
+              </a:rPr>
+              <a:t>Not needed for PPID-based fragmentation.</a:t>
             </a:r>
             <a:endParaRPr lang="en-US" b="0" i="0" u="none" strike="noStrike" dirty="0">
               <a:solidFill>
                 <a:srgbClr val="222222"/>
               </a:solidFill>
               <a:effectLst/>
-              <a:latin typeface="Noto Sans" panose="020B0502040504020204" pitchFamily="34" charset="0"/>
             </a:endParaRPr>
           </a:p>
           <a:p>
             <a:r>
+              <a:rPr lang="en-US" dirty="0">
+                <a:solidFill>
+                  <a:srgbClr val="222222"/>
+                </a:solidFill>
+              </a:rPr>
+              <a:t>Partial delivery (MUST)</a:t>
+            </a:r>
+            <a:br>
+              <a:rPr lang="en-US" dirty="0">
+                <a:solidFill>
+                  <a:srgbClr val="FF0000"/>
+                </a:solidFill>
+              </a:rPr>
+            </a:br>
+            <a:r>
+              <a:rPr lang="en-US" dirty="0">
+                <a:solidFill>
+                  <a:srgbClr val="FF0000"/>
+                </a:solidFill>
+              </a:rPr>
+              <a:t>Yes, but not needed at the SCTP layer. Needs to be done above DTLS.</a:t>
+            </a:r>
+            <a:endParaRPr lang="en-US" b="0" i="0" u="none" strike="noStrike" dirty="0">
+              <a:solidFill>
+                <a:srgbClr val="FF0000"/>
+              </a:solidFill>
+              <a:effectLst/>
+            </a:endParaRPr>
+          </a:p>
+          <a:p>
+            <a:r>
               <a:rPr lang="en-US" b="0" i="0" u="none" strike="noStrike" dirty="0">
                 <a:solidFill>
                   <a:srgbClr val="222222"/>
                 </a:solidFill>
                 <a:effectLst/>
-                <a:latin typeface="Noto Sans" panose="020B0502040504020204" pitchFamily="34" charset="0"/>
-              </a:rPr>
-              <a:t>Fundamental</a:t>
-            </a:r>
-          </a:p>
-          <a:p>
-            <a:pPr lvl="1"/>
-            <a:r>
-              <a:rPr lang="en-US" b="0" i="0" u="none" strike="noStrike" dirty="0">
-                <a:solidFill>
-                  <a:srgbClr val="222222"/>
-                </a:solidFill>
-                <a:effectLst/>
-                <a:latin typeface="Noto Sans" panose="020B0502040504020204" pitchFamily="34" charset="0"/>
-              </a:rPr>
-              <a:t>Mutual authentication (MUST)</a:t>
+              </a:rPr>
+              <a:t>User message sizes must not be limited by a protocol implementation</a:t>
             </a:r>
             <a:br>
               <a:rPr lang="en-US" b="0" i="0" u="none" strike="noStrike" dirty="0">
@@ -4584,7 +4474,6 @@
                   <a:srgbClr val="222222"/>
                 </a:solidFill>
                 <a:effectLst/>
-                <a:latin typeface="Noto Sans" panose="020B0502040504020204" pitchFamily="34" charset="0"/>
               </a:rPr>
             </a:br>
             <a:r>
@@ -4593,399 +4482,111 @@
                   <a:srgbClr val="FF0000"/>
                 </a:solidFill>
                 <a:effectLst/>
-                <a:latin typeface="Noto Sans" panose="020B0502040504020204" pitchFamily="34" charset="0"/>
-              </a:rPr>
-              <a:t>Yes.</a:t>
-            </a:r>
-          </a:p>
-          <a:p>
-            <a:pPr lvl="1"/>
-            <a:r>
-              <a:rPr lang="en-US" b="0" i="0" u="none" strike="noStrike" dirty="0">
-                <a:solidFill>
-                  <a:srgbClr val="222222"/>
-                </a:solidFill>
-                <a:effectLst/>
-                <a:latin typeface="Noto Sans" panose="020B0502040504020204" pitchFamily="34" charset="0"/>
-              </a:rPr>
-              <a:t>Privacy and integrity is required for user data (MUST)</a:t>
-            </a:r>
-            <a:br>
-              <a:rPr lang="en-US" b="0" i="0" u="none" strike="noStrike" dirty="0">
-                <a:solidFill>
-                  <a:srgbClr val="222222"/>
-                </a:solidFill>
-                <a:effectLst/>
-                <a:latin typeface="Noto Sans" panose="020B0502040504020204" pitchFamily="34" charset="0"/>
-              </a:rPr>
-            </a:br>
-            <a:r>
-              <a:rPr lang="en-US" b="0" i="0" u="none" strike="noStrike" dirty="0">
-                <a:solidFill>
-                  <a:srgbClr val="FF0000"/>
-                </a:solidFill>
-                <a:effectLst/>
-                <a:latin typeface="Noto Sans" panose="020B0502040504020204" pitchFamily="34" charset="0"/>
-              </a:rPr>
-              <a:t>Yes.</a:t>
+              </a:rPr>
+              <a:t>Yes, for ordered reliable messages.</a:t>
             </a:r>
             <a:endParaRPr lang="en-US" b="0" i="0" u="none" strike="noStrike" dirty="0">
               <a:solidFill>
                 <a:srgbClr val="222222"/>
               </a:solidFill>
               <a:effectLst/>
-              <a:latin typeface="Noto Sans" panose="020B0502040504020204" pitchFamily="34" charset="0"/>
             </a:endParaRPr>
           </a:p>
           <a:p>
             <a:r>
               <a:rPr lang="en-US" dirty="0">
-                <a:solidFill>
-                  <a:srgbClr val="222222"/>
-                </a:solidFill>
-                <a:latin typeface="Noto Sans" panose="020B0502040504020204" pitchFamily="34" charset="0"/>
-              </a:rPr>
-              <a:t>Best practices for long lived sessions</a:t>
-            </a:r>
-            <a:endParaRPr lang="en-US" b="0" i="0" u="none" strike="noStrike" dirty="0">
-              <a:solidFill>
-                <a:srgbClr val="222222"/>
-              </a:solidFill>
+                <a:effectLst/>
+              </a:rPr>
+              <a:t>It is implementable using an SCTP userland stack (MUST)</a:t>
+            </a:r>
+            <a:br>
+              <a:rPr lang="en-US" dirty="0">
+                <a:effectLst/>
+              </a:rPr>
+            </a:br>
+            <a:r>
+              <a:rPr lang="en-US" dirty="0">
+                <a:solidFill>
+                  <a:srgbClr val="FF0000"/>
+                </a:solidFill>
+                <a:effectLst/>
+              </a:rPr>
+              <a:t>Yes.</a:t>
+            </a:r>
+            <a:endParaRPr lang="en-US" dirty="0">
               <a:effectLst/>
-              <a:latin typeface="Noto Sans" panose="020B0502040504020204" pitchFamily="34" charset="0"/>
             </a:endParaRPr>
           </a:p>
           <a:p>
-            <a:pPr lvl="1"/>
+            <a:r>
+              <a:rPr lang="en-US" dirty="0"/>
+              <a:t>It is implementable using an SCTP kernel stack (MUST)</a:t>
+            </a:r>
+            <a:br>
+              <a:rPr lang="en-US" dirty="0"/>
+            </a:br>
             <a:r>
               <a:rPr lang="en-US" dirty="0">
                 <a:solidFill>
-                  <a:srgbClr val="222222"/>
-                </a:solidFill>
-                <a:latin typeface="Noto Sans" panose="020B0502040504020204" pitchFamily="34" charset="0"/>
-              </a:rPr>
-              <a:t>P</a:t>
-            </a:r>
-            <a:r>
-              <a:rPr lang="en-US" b="0" i="0" u="none" strike="noStrike" dirty="0">
-                <a:solidFill>
-                  <a:srgbClr val="222222"/>
-                </a:solidFill>
+                  <a:srgbClr val="FF0000"/>
+                </a:solidFill>
+              </a:rPr>
+              <a:t>Yes.</a:t>
+            </a:r>
+          </a:p>
+          <a:p>
+            <a:r>
+              <a:rPr lang="en-US" dirty="0"/>
+              <a:t>It is implementable using an open source (not referring to licensing) SCTP stack (SHOULD)</a:t>
+            </a:r>
+            <a:br>
+              <a:rPr lang="en-US" dirty="0"/>
+            </a:br>
+            <a:r>
+              <a:rPr lang="en-US" dirty="0">
+                <a:solidFill>
+                  <a:srgbClr val="FF0000"/>
+                </a:solidFill>
+              </a:rPr>
+              <a:t>Yes.</a:t>
+            </a:r>
+          </a:p>
+          <a:p>
+            <a:r>
+              <a:rPr lang="en-US" dirty="0">
                 <a:effectLst/>
-                <a:latin typeface="Noto Sans" panose="020B0502040504020204" pitchFamily="34" charset="0"/>
-              </a:rPr>
-              <a:t>eriodic re-authentication, for example allowing a certificate update (MUST)</a:t>
+              </a:rPr>
+              <a:t>TBD: </a:t>
+            </a:r>
+            <a:r>
+              <a:rPr lang="en-US" dirty="0"/>
+              <a:t>l</a:t>
+            </a:r>
+            <a:r>
+              <a:rPr lang="en-US" dirty="0">
+                <a:effectLst/>
+              </a:rPr>
+              <a:t>icensin</a:t>
+            </a:r>
+            <a:r>
+              <a:rPr lang="en-US" dirty="0"/>
+              <a:t>g</a:t>
             </a:r>
             <a:br>
-              <a:rPr lang="en-US" b="0" i="0" u="none" strike="noStrike" dirty="0">
-                <a:solidFill>
-                  <a:srgbClr val="222222"/>
-                </a:solidFill>
-                <a:effectLst/>
-                <a:latin typeface="Noto Sans" panose="020B0502040504020204" pitchFamily="34" charset="0"/>
-              </a:rPr>
+              <a:rPr lang="en-US" dirty="0"/>
             </a:br>
             <a:r>
-              <a:rPr lang="en-US" b="0" i="0" u="none" strike="noStrike" dirty="0">
+              <a:rPr lang="en-US" dirty="0">
                 <a:solidFill>
                   <a:srgbClr val="FF0000"/>
                 </a:solidFill>
-                <a:effectLst/>
-                <a:latin typeface="Noto Sans" panose="020B0502040504020204" pitchFamily="34" charset="0"/>
-              </a:rPr>
-              <a:t>Yes using draft-</a:t>
-            </a:r>
-            <a:r>
-              <a:rPr lang="en-US" b="0" i="0" u="none" strike="noStrike" dirty="0" err="1">
-                <a:solidFill>
-                  <a:srgbClr val="FF0000"/>
-                </a:solidFill>
-                <a:effectLst/>
-                <a:latin typeface="Noto Sans" panose="020B0502040504020204" pitchFamily="34" charset="0"/>
-              </a:rPr>
-              <a:t>tschofenig</a:t>
-            </a:r>
-            <a:r>
-              <a:rPr lang="en-US" b="0" i="0" u="none" strike="noStrike" dirty="0">
-                <a:solidFill>
-                  <a:srgbClr val="FF0000"/>
-                </a:solidFill>
-                <a:effectLst/>
-                <a:latin typeface="Noto Sans" panose="020B0502040504020204" pitchFamily="34" charset="0"/>
-              </a:rPr>
-              <a:t>-</a:t>
-            </a:r>
-            <a:r>
-              <a:rPr lang="en-US" b="0" i="0" u="none" strike="noStrike" dirty="0" err="1">
-                <a:solidFill>
-                  <a:srgbClr val="FF0000"/>
-                </a:solidFill>
-                <a:effectLst/>
-                <a:latin typeface="Noto Sans" panose="020B0502040504020204" pitchFamily="34" charset="0"/>
-              </a:rPr>
-              <a:t>tls</a:t>
-            </a:r>
-            <a:r>
-              <a:rPr lang="en-US" b="0" i="0" u="none" strike="noStrike" dirty="0">
-                <a:solidFill>
-                  <a:srgbClr val="FF0000"/>
-                </a:solidFill>
-                <a:effectLst/>
-                <a:latin typeface="Noto Sans" panose="020B0502040504020204" pitchFamily="34" charset="0"/>
-              </a:rPr>
-              <a:t>-post-handshake.</a:t>
-            </a:r>
-            <a:endParaRPr lang="en-US" b="0" i="0" u="none" strike="noStrike" dirty="0">
-              <a:solidFill>
-                <a:srgbClr val="222222"/>
-              </a:solidFill>
+              </a:rPr>
+              <a:t>As far as authors are affected: no IPR.</a:t>
+            </a:r>
+            <a:endParaRPr lang="en-US" dirty="0">
               <a:effectLst/>
-              <a:latin typeface="Noto Sans" panose="020B0502040504020204" pitchFamily="34" charset="0"/>
             </a:endParaRPr>
           </a:p>
-          <a:p>
-            <a:pPr lvl="1"/>
-            <a:r>
-              <a:rPr lang="en-US" b="0" i="0" u="none" strike="noStrike" dirty="0">
-                <a:solidFill>
-                  <a:srgbClr val="222222"/>
-                </a:solidFill>
-                <a:effectLst/>
-                <a:latin typeface="Noto Sans" panose="020B0502040504020204" pitchFamily="34" charset="0"/>
-              </a:rPr>
-              <a:t>It must the possible to run DH, for example once per hour or every 100GB. (MUST)</a:t>
-            </a:r>
-            <a:br>
-              <a:rPr lang="en-US" b="0" i="0" u="none" strike="noStrike" dirty="0">
-                <a:solidFill>
-                  <a:srgbClr val="222222"/>
-                </a:solidFill>
-                <a:effectLst/>
-                <a:latin typeface="Noto Sans" panose="020B0502040504020204" pitchFamily="34" charset="0"/>
-              </a:rPr>
-            </a:br>
-            <a:r>
-              <a:rPr lang="en-US" dirty="0">
-                <a:solidFill>
-                  <a:srgbClr val="FF0000"/>
-                </a:solidFill>
-                <a:latin typeface="Noto Sans" panose="020B0502040504020204" pitchFamily="34" charset="0"/>
-              </a:rPr>
-              <a:t>Yes using </a:t>
-            </a:r>
-            <a:r>
-              <a:rPr lang="en-US" i="0" u="none" strike="noStrike" dirty="0">
-                <a:solidFill>
-                  <a:srgbClr val="FF0000"/>
-                </a:solidFill>
-                <a:effectLst/>
-                <a:latin typeface="Noto Sans" panose="020B0502040504020204" pitchFamily="34" charset="0"/>
-                <a:ea typeface="Noto Sans" panose="020B0502040504020204" pitchFamily="34" charset="0"/>
-                <a:cs typeface="Noto Sans" panose="020B0502040504020204" pitchFamily="34" charset="0"/>
-              </a:rPr>
-              <a:t>draft-</a:t>
-            </a:r>
-            <a:r>
-              <a:rPr lang="en-US" i="0" u="none" strike="noStrike" dirty="0" err="1">
-                <a:solidFill>
-                  <a:srgbClr val="FF0000"/>
-                </a:solidFill>
-                <a:effectLst/>
-                <a:latin typeface="Noto Sans" panose="020B0502040504020204" pitchFamily="34" charset="0"/>
-                <a:ea typeface="Noto Sans" panose="020B0502040504020204" pitchFamily="34" charset="0"/>
-                <a:cs typeface="Noto Sans" panose="020B0502040504020204" pitchFamily="34" charset="0"/>
-              </a:rPr>
-              <a:t>tschofenig</a:t>
-            </a:r>
-            <a:r>
-              <a:rPr lang="en-US" i="0" u="none" strike="noStrike" dirty="0">
-                <a:solidFill>
-                  <a:srgbClr val="FF0000"/>
-                </a:solidFill>
-                <a:effectLst/>
-                <a:latin typeface="Noto Sans" panose="020B0502040504020204" pitchFamily="34" charset="0"/>
-                <a:ea typeface="Noto Sans" panose="020B0502040504020204" pitchFamily="34" charset="0"/>
-                <a:cs typeface="Noto Sans" panose="020B0502040504020204" pitchFamily="34" charset="0"/>
-              </a:rPr>
-              <a:t>-</a:t>
-            </a:r>
-            <a:r>
-              <a:rPr lang="en-US" i="0" u="none" strike="noStrike" dirty="0" err="1">
-                <a:solidFill>
-                  <a:srgbClr val="FF0000"/>
-                </a:solidFill>
-                <a:effectLst/>
-                <a:latin typeface="Noto Sans" panose="020B0502040504020204" pitchFamily="34" charset="0"/>
-                <a:ea typeface="Noto Sans" panose="020B0502040504020204" pitchFamily="34" charset="0"/>
-                <a:cs typeface="Noto Sans" panose="020B0502040504020204" pitchFamily="34" charset="0"/>
-              </a:rPr>
-              <a:t>tls</a:t>
-            </a:r>
-            <a:r>
-              <a:rPr lang="en-US" i="0" u="none" strike="noStrike" dirty="0">
-                <a:solidFill>
-                  <a:srgbClr val="FF0000"/>
-                </a:solidFill>
-                <a:effectLst/>
-                <a:latin typeface="Noto Sans" panose="020B0502040504020204" pitchFamily="34" charset="0"/>
-                <a:ea typeface="Noto Sans" panose="020B0502040504020204" pitchFamily="34" charset="0"/>
-                <a:cs typeface="Noto Sans" panose="020B0502040504020204" pitchFamily="34" charset="0"/>
-              </a:rPr>
-              <a:t>-extended-key-update</a:t>
-            </a:r>
-          </a:p>
-          <a:p>
-            <a:r>
-              <a:rPr lang="en-US" b="0" i="0" u="none" strike="noStrike" dirty="0">
-                <a:solidFill>
-                  <a:srgbClr val="222222"/>
-                </a:solidFill>
-                <a:effectLst/>
-                <a:latin typeface="Noto Sans" panose="020B0502040504020204" pitchFamily="34" charset="0"/>
-              </a:rPr>
-              <a:t>Availability</a:t>
-            </a:r>
-          </a:p>
-          <a:p>
-            <a:pPr lvl="1"/>
-            <a:r>
-              <a:rPr lang="en-US" dirty="0">
-                <a:solidFill>
-                  <a:srgbClr val="222222"/>
-                </a:solidFill>
-                <a:latin typeface="Noto Sans" panose="020B0502040504020204" pitchFamily="34" charset="0"/>
-              </a:rPr>
-              <a:t>Replay or injection must not </a:t>
-            </a:r>
-            <a:r>
-              <a:rPr lang="en-US" b="0" i="0" u="none" strike="noStrike" dirty="0">
-                <a:solidFill>
-                  <a:srgbClr val="222222"/>
-                </a:solidFill>
-                <a:effectLst/>
-                <a:latin typeface="Noto Sans" panose="020B0502040504020204" pitchFamily="34" charset="0"/>
-              </a:rPr>
-              <a:t>affect the availability of the association. (MUST)</a:t>
-            </a:r>
-            <a:br>
-              <a:rPr lang="en-US" b="0" i="0" u="none" strike="noStrike" dirty="0">
-                <a:solidFill>
-                  <a:srgbClr val="222222"/>
-                </a:solidFill>
-                <a:effectLst/>
-                <a:latin typeface="Noto Sans" panose="020B0502040504020204" pitchFamily="34" charset="0"/>
-              </a:rPr>
-            </a:br>
-            <a:r>
-              <a:rPr lang="en-US" b="0" i="0" u="none" strike="noStrike" dirty="0">
-                <a:solidFill>
-                  <a:srgbClr val="FF0000"/>
-                </a:solidFill>
-                <a:effectLst/>
-                <a:latin typeface="Noto Sans" panose="020B0502040504020204" pitchFamily="34" charset="0"/>
-              </a:rPr>
-              <a:t>Done using SCTP AUTH.</a:t>
-            </a:r>
-            <a:endParaRPr lang="en-US" b="0" i="0" u="none" strike="noStrike" dirty="0">
-              <a:solidFill>
-                <a:srgbClr val="222222"/>
-              </a:solidFill>
-              <a:effectLst/>
-              <a:latin typeface="Noto Sans" panose="020B0502040504020204" pitchFamily="34" charset="0"/>
-            </a:endParaRPr>
-          </a:p>
-          <a:p>
-            <a:pPr lvl="1"/>
-            <a:r>
-              <a:rPr lang="en-US" b="0" i="0" u="none" strike="noStrike" dirty="0">
-                <a:solidFill>
-                  <a:srgbClr val="222222"/>
-                </a:solidFill>
-                <a:effectLst/>
-                <a:latin typeface="Noto Sans" panose="020B0502040504020204" pitchFamily="34" charset="0"/>
-              </a:rPr>
-              <a:t>In particular, the SCTP restart procedure must not allow to take over an SCTP association by an attacker. (MUST)</a:t>
-            </a:r>
-            <a:br>
-              <a:rPr lang="en-US" b="0" i="0" u="none" strike="noStrike" dirty="0">
-                <a:solidFill>
-                  <a:srgbClr val="222222"/>
-                </a:solidFill>
-                <a:effectLst/>
-                <a:latin typeface="Noto Sans" panose="020B0502040504020204" pitchFamily="34" charset="0"/>
-              </a:rPr>
-            </a:br>
-            <a:r>
-              <a:rPr lang="en-US" dirty="0">
-                <a:solidFill>
-                  <a:srgbClr val="FF0000"/>
-                </a:solidFill>
-                <a:latin typeface="Noto Sans" panose="020B0502040504020204" pitchFamily="34" charset="0"/>
-              </a:rPr>
-              <a:t>Done using SCTP AUTH or draft-</a:t>
-            </a:r>
-            <a:r>
-              <a:rPr lang="en-US" dirty="0" err="1">
-                <a:solidFill>
-                  <a:srgbClr val="FF0000"/>
-                </a:solidFill>
-                <a:latin typeface="Noto Sans" panose="020B0502040504020204" pitchFamily="34" charset="0"/>
-              </a:rPr>
-              <a:t>tuexen</a:t>
-            </a:r>
-            <a:r>
-              <a:rPr lang="en-US" dirty="0">
-                <a:solidFill>
-                  <a:srgbClr val="FF0000"/>
-                </a:solidFill>
-                <a:latin typeface="Noto Sans" panose="020B0502040504020204" pitchFamily="34" charset="0"/>
-              </a:rPr>
-              <a:t>-</a:t>
-            </a:r>
-            <a:r>
-              <a:rPr lang="en-US" dirty="0" err="1">
-                <a:solidFill>
-                  <a:srgbClr val="FF0000"/>
-                </a:solidFill>
-                <a:latin typeface="Noto Sans" panose="020B0502040504020204" pitchFamily="34" charset="0"/>
-              </a:rPr>
-              <a:t>tsvwg</a:t>
-            </a:r>
-            <a:r>
-              <a:rPr lang="en-US" dirty="0">
-                <a:solidFill>
-                  <a:srgbClr val="FF0000"/>
-                </a:solidFill>
-                <a:latin typeface="Noto Sans" panose="020B0502040504020204" pitchFamily="34" charset="0"/>
-              </a:rPr>
-              <a:t>-</a:t>
-            </a:r>
-            <a:r>
-              <a:rPr lang="en-US" dirty="0" err="1">
-                <a:solidFill>
-                  <a:srgbClr val="FF0000"/>
-                </a:solidFill>
-                <a:latin typeface="Noto Sans" panose="020B0502040504020204" pitchFamily="34" charset="0"/>
-              </a:rPr>
-              <a:t>sctp</a:t>
-            </a:r>
-            <a:r>
-              <a:rPr lang="en-US" dirty="0">
-                <a:solidFill>
-                  <a:srgbClr val="FF0000"/>
-                </a:solidFill>
-                <a:latin typeface="Noto Sans" panose="020B0502040504020204" pitchFamily="34" charset="0"/>
-              </a:rPr>
-              <a:t>-restart-token (to be submitted).</a:t>
-            </a:r>
-            <a:endParaRPr lang="en-US" b="0" i="0" u="none" strike="noStrike" dirty="0">
-              <a:solidFill>
-                <a:srgbClr val="222222"/>
-              </a:solidFill>
-              <a:effectLst/>
-              <a:latin typeface="Noto Sans" panose="020B0502040504020204" pitchFamily="34" charset="0"/>
-            </a:endParaRPr>
-          </a:p>
         </p:txBody>
       </p:sp>
       <p:sp>
@@ -4993,7 +4594,7 @@
           <p:cNvPr id="4" name="Slide Number Placeholder 3">
             <a:extLst>
               <a:ext uri="{FF2B5EF4-FFF2-40B4-BE49-F238E27FC236}">
-                <a16:creationId xmlns:a16="http://schemas.microsoft.com/office/drawing/2014/main" id="{C7E87A53-2C6D-740A-9668-18465FAB97B4}"/>
+                <a16:creationId xmlns:a16="http://schemas.microsoft.com/office/drawing/2014/main" id="{80A73420-E304-34D9-B5E3-D70DA783626A}"/>
               </a:ext>
             </a:extLst>
           </p:cNvPr>
@@ -5020,7 +4621,7 @@
     </p:spTree>
     <p:extLst>
       <p:ext uri="{BB962C8B-B14F-4D97-AF65-F5344CB8AC3E}">
-        <p14:creationId xmlns:p14="http://schemas.microsoft.com/office/powerpoint/2010/main" val="3601856472"/>
+        <p14:creationId xmlns:p14="http://schemas.microsoft.com/office/powerpoint/2010/main" val="211260678"/>
       </p:ext>
     </p:extLst>
   </p:cSld>
@@ -5052,6 +4653,587 @@
           <p:cNvPr id="2" name="Title 1">
             <a:extLst>
               <a:ext uri="{FF2B5EF4-FFF2-40B4-BE49-F238E27FC236}">
+                <a16:creationId xmlns:a16="http://schemas.microsoft.com/office/drawing/2014/main" id="{88BD570C-926F-7FA2-2BE6-DDC8641D81B3}"/>
+              </a:ext>
+            </a:extLst>
+          </p:cNvPr>
+          <p:cNvSpPr>
+            <a:spLocks noGrp="1"/>
+          </p:cNvSpPr>
+          <p:nvPr>
+            <p:ph type="title"/>
+          </p:nvPr>
+        </p:nvSpPr>
+        <p:spPr/>
+        <p:txBody>
+          <a:bodyPr/>
+          <a:lstStyle/>
+          <a:p>
+            <a:r>
+              <a:rPr lang="en-US" dirty="0"/>
+              <a:t>Security Requirements</a:t>
+            </a:r>
+          </a:p>
+        </p:txBody>
+      </p:sp>
+      <p:sp>
+        <p:nvSpPr>
+          <p:cNvPr id="3" name="Content Placeholder 2">
+            <a:extLst>
+              <a:ext uri="{FF2B5EF4-FFF2-40B4-BE49-F238E27FC236}">
+                <a16:creationId xmlns:a16="http://schemas.microsoft.com/office/drawing/2014/main" id="{99082230-7BEC-751E-A377-4F998C40A09B}"/>
+              </a:ext>
+            </a:extLst>
+          </p:cNvPr>
+          <p:cNvSpPr>
+            <a:spLocks noGrp="1"/>
+          </p:cNvSpPr>
+          <p:nvPr>
+            <p:ph idx="1"/>
+          </p:nvPr>
+        </p:nvSpPr>
+        <p:spPr/>
+        <p:txBody>
+          <a:bodyPr>
+            <a:normAutofit fontScale="62500" lnSpcReduction="20000"/>
+          </a:bodyPr>
+          <a:lstStyle/>
+          <a:p>
+            <a:r>
+              <a:rPr lang="en-US" b="0" i="0" u="none" strike="noStrike" dirty="0">
+                <a:solidFill>
+                  <a:srgbClr val="222222"/>
+                </a:solidFill>
+                <a:effectLst/>
+                <a:latin typeface="Noto Sans" panose="020B0502040504020204" pitchFamily="34" charset="0"/>
+              </a:rPr>
+              <a:t>An on-path attacker being able to replay messages, insert messages, or modify messages is considered. (MUST)</a:t>
+            </a:r>
+            <a:br>
+              <a:rPr lang="en-US" b="0" i="0" u="none" strike="noStrike" dirty="0">
+                <a:solidFill>
+                  <a:srgbClr val="222222"/>
+                </a:solidFill>
+                <a:effectLst/>
+                <a:latin typeface="Noto Sans" panose="020B0502040504020204" pitchFamily="34" charset="0"/>
+              </a:rPr>
+            </a:br>
+            <a:r>
+              <a:rPr lang="en-US" b="0" i="0" u="none" strike="noStrike" dirty="0">
+                <a:solidFill>
+                  <a:srgbClr val="FF0000"/>
+                </a:solidFill>
+                <a:effectLst/>
+                <a:latin typeface="Noto Sans" panose="020B0502040504020204" pitchFamily="34" charset="0"/>
+              </a:rPr>
+              <a:t>Yes.</a:t>
+            </a:r>
+            <a:endParaRPr lang="en-US" b="0" i="0" u="none" strike="noStrike" dirty="0">
+              <a:solidFill>
+                <a:srgbClr val="222222"/>
+              </a:solidFill>
+              <a:effectLst/>
+              <a:latin typeface="Noto Sans" panose="020B0502040504020204" pitchFamily="34" charset="0"/>
+            </a:endParaRPr>
+          </a:p>
+          <a:p>
+            <a:r>
+              <a:rPr lang="en-US" b="0" i="0" u="none" strike="noStrike" dirty="0">
+                <a:solidFill>
+                  <a:srgbClr val="222222"/>
+                </a:solidFill>
+                <a:effectLst/>
+                <a:latin typeface="Noto Sans" panose="020B0502040504020204" pitchFamily="34" charset="0"/>
+              </a:rPr>
+              <a:t>Fundamental</a:t>
+            </a:r>
+          </a:p>
+          <a:p>
+            <a:pPr lvl="1"/>
+            <a:r>
+              <a:rPr lang="en-US" b="0" i="0" u="none" strike="noStrike" dirty="0">
+                <a:solidFill>
+                  <a:srgbClr val="222222"/>
+                </a:solidFill>
+                <a:effectLst/>
+                <a:latin typeface="Noto Sans" panose="020B0502040504020204" pitchFamily="34" charset="0"/>
+              </a:rPr>
+              <a:t>Mutual authentication (MUST)</a:t>
+            </a:r>
+            <a:br>
+              <a:rPr lang="en-US" b="0" i="0" u="none" strike="noStrike" dirty="0">
+                <a:solidFill>
+                  <a:srgbClr val="222222"/>
+                </a:solidFill>
+                <a:effectLst/>
+                <a:latin typeface="Noto Sans" panose="020B0502040504020204" pitchFamily="34" charset="0"/>
+              </a:rPr>
+            </a:br>
+            <a:r>
+              <a:rPr lang="en-US" b="0" i="0" u="none" strike="noStrike" dirty="0">
+                <a:solidFill>
+                  <a:srgbClr val="FF0000"/>
+                </a:solidFill>
+                <a:effectLst/>
+                <a:latin typeface="Noto Sans" panose="020B0502040504020204" pitchFamily="34" charset="0"/>
+              </a:rPr>
+              <a:t>Yes.</a:t>
+            </a:r>
+          </a:p>
+          <a:p>
+            <a:pPr lvl="1"/>
+            <a:r>
+              <a:rPr lang="en-US" b="0" i="0" u="none" strike="noStrike" dirty="0">
+                <a:solidFill>
+                  <a:srgbClr val="222222"/>
+                </a:solidFill>
+                <a:effectLst/>
+                <a:latin typeface="Noto Sans" panose="020B0502040504020204" pitchFamily="34" charset="0"/>
+              </a:rPr>
+              <a:t>Privacy and integrity is required for user data (MUST)</a:t>
+            </a:r>
+            <a:br>
+              <a:rPr lang="en-US" b="0" i="0" u="none" strike="noStrike" dirty="0">
+                <a:solidFill>
+                  <a:srgbClr val="222222"/>
+                </a:solidFill>
+                <a:effectLst/>
+                <a:latin typeface="Noto Sans" panose="020B0502040504020204" pitchFamily="34" charset="0"/>
+              </a:rPr>
+            </a:br>
+            <a:r>
+              <a:rPr lang="en-US" b="0" i="0" u="none" strike="noStrike" dirty="0">
+                <a:solidFill>
+                  <a:srgbClr val="FF0000"/>
+                </a:solidFill>
+                <a:effectLst/>
+                <a:latin typeface="Noto Sans" panose="020B0502040504020204" pitchFamily="34" charset="0"/>
+              </a:rPr>
+              <a:t>Yes.</a:t>
+            </a:r>
+            <a:endParaRPr lang="en-US" b="0" i="0" u="none" strike="noStrike" dirty="0">
+              <a:solidFill>
+                <a:srgbClr val="222222"/>
+              </a:solidFill>
+              <a:effectLst/>
+              <a:latin typeface="Noto Sans" panose="020B0502040504020204" pitchFamily="34" charset="0"/>
+            </a:endParaRPr>
+          </a:p>
+          <a:p>
+            <a:r>
+              <a:rPr lang="en-US" dirty="0">
+                <a:solidFill>
+                  <a:srgbClr val="222222"/>
+                </a:solidFill>
+                <a:latin typeface="Noto Sans" panose="020B0502040504020204" pitchFamily="34" charset="0"/>
+              </a:rPr>
+              <a:t>Best practices for long lived sessions</a:t>
+            </a:r>
+            <a:endParaRPr lang="en-US" b="0" i="0" u="none" strike="noStrike" dirty="0">
+              <a:solidFill>
+                <a:srgbClr val="222222"/>
+              </a:solidFill>
+              <a:effectLst/>
+              <a:latin typeface="Noto Sans" panose="020B0502040504020204" pitchFamily="34" charset="0"/>
+            </a:endParaRPr>
+          </a:p>
+          <a:p>
+            <a:pPr lvl="1"/>
+            <a:r>
+              <a:rPr lang="en-US" dirty="0">
+                <a:solidFill>
+                  <a:srgbClr val="222222"/>
+                </a:solidFill>
+                <a:latin typeface="Noto Sans" panose="020B0502040504020204" pitchFamily="34" charset="0"/>
+              </a:rPr>
+              <a:t>P</a:t>
+            </a:r>
+            <a:r>
+              <a:rPr lang="en-US" b="0" i="0" u="none" strike="noStrike" dirty="0">
+                <a:solidFill>
+                  <a:srgbClr val="222222"/>
+                </a:solidFill>
+                <a:effectLst/>
+                <a:latin typeface="Noto Sans" panose="020B0502040504020204" pitchFamily="34" charset="0"/>
+              </a:rPr>
+              <a:t>eriodic re-authentication, for example allowing a certificate update (MUST)</a:t>
+            </a:r>
+            <a:br>
+              <a:rPr lang="en-US" b="0" i="0" u="none" strike="noStrike" dirty="0">
+                <a:solidFill>
+                  <a:srgbClr val="222222"/>
+                </a:solidFill>
+                <a:effectLst/>
+                <a:latin typeface="Noto Sans" panose="020B0502040504020204" pitchFamily="34" charset="0"/>
+              </a:rPr>
+            </a:br>
+            <a:r>
+              <a:rPr lang="en-US" b="0" i="0" u="none" strike="noStrike" dirty="0">
+                <a:solidFill>
+                  <a:srgbClr val="FF0000"/>
+                </a:solidFill>
+                <a:effectLst/>
+                <a:latin typeface="Noto Sans" panose="020B0502040504020204" pitchFamily="34" charset="0"/>
+              </a:rPr>
+              <a:t>Yes using draft-</a:t>
+            </a:r>
+            <a:r>
+              <a:rPr lang="en-US" b="0" i="0" u="none" strike="noStrike" dirty="0" err="1">
+                <a:solidFill>
+                  <a:srgbClr val="FF0000"/>
+                </a:solidFill>
+                <a:effectLst/>
+                <a:latin typeface="Noto Sans" panose="020B0502040504020204" pitchFamily="34" charset="0"/>
+              </a:rPr>
+              <a:t>tschofenig</a:t>
+            </a:r>
+            <a:r>
+              <a:rPr lang="en-US" b="0" i="0" u="none" strike="noStrike" dirty="0">
+                <a:solidFill>
+                  <a:srgbClr val="FF0000"/>
+                </a:solidFill>
+                <a:effectLst/>
+                <a:latin typeface="Noto Sans" panose="020B0502040504020204" pitchFamily="34" charset="0"/>
+              </a:rPr>
+              <a:t>-</a:t>
+            </a:r>
+            <a:r>
+              <a:rPr lang="en-US" b="0" i="0" u="none" strike="noStrike" dirty="0" err="1">
+                <a:solidFill>
+                  <a:srgbClr val="FF0000"/>
+                </a:solidFill>
+                <a:effectLst/>
+                <a:latin typeface="Noto Sans" panose="020B0502040504020204" pitchFamily="34" charset="0"/>
+              </a:rPr>
+              <a:t>tls</a:t>
+            </a:r>
+            <a:r>
+              <a:rPr lang="en-US" b="0" i="0" u="none" strike="noStrike" dirty="0">
+                <a:solidFill>
+                  <a:srgbClr val="FF0000"/>
+                </a:solidFill>
+                <a:effectLst/>
+                <a:latin typeface="Noto Sans" panose="020B0502040504020204" pitchFamily="34" charset="0"/>
+              </a:rPr>
+              <a:t>-post-handshake.</a:t>
+            </a:r>
+            <a:endParaRPr lang="en-US" b="0" i="0" u="none" strike="noStrike" dirty="0">
+              <a:solidFill>
+                <a:srgbClr val="222222"/>
+              </a:solidFill>
+              <a:effectLst/>
+              <a:latin typeface="Noto Sans" panose="020B0502040504020204" pitchFamily="34" charset="0"/>
+            </a:endParaRPr>
+          </a:p>
+          <a:p>
+            <a:pPr lvl="1"/>
+            <a:r>
+              <a:rPr lang="en-US" b="0" i="0" u="none" strike="noStrike" dirty="0">
+                <a:solidFill>
+                  <a:srgbClr val="222222"/>
+                </a:solidFill>
+                <a:effectLst/>
+                <a:latin typeface="Noto Sans" panose="020B0502040504020204" pitchFamily="34" charset="0"/>
+              </a:rPr>
+              <a:t>It must the possible to run DH, for example once per hour or every 100GB. (MUST)</a:t>
+            </a:r>
+            <a:br>
+              <a:rPr lang="en-US" b="0" i="0" u="none" strike="noStrike" dirty="0">
+                <a:solidFill>
+                  <a:srgbClr val="222222"/>
+                </a:solidFill>
+                <a:effectLst/>
+                <a:latin typeface="Noto Sans" panose="020B0502040504020204" pitchFamily="34" charset="0"/>
+              </a:rPr>
+            </a:br>
+            <a:r>
+              <a:rPr lang="en-US" dirty="0">
+                <a:solidFill>
+                  <a:srgbClr val="FF0000"/>
+                </a:solidFill>
+                <a:latin typeface="Noto Sans" panose="020B0502040504020204" pitchFamily="34" charset="0"/>
+              </a:rPr>
+              <a:t>Yes using </a:t>
+            </a:r>
+            <a:r>
+              <a:rPr lang="en-US" i="0" u="none" strike="noStrike" dirty="0">
+                <a:solidFill>
+                  <a:srgbClr val="FF0000"/>
+                </a:solidFill>
+                <a:effectLst/>
+                <a:latin typeface="Noto Sans" panose="020B0502040504020204" pitchFamily="34" charset="0"/>
+                <a:ea typeface="Noto Sans" panose="020B0502040504020204" pitchFamily="34" charset="0"/>
+                <a:cs typeface="Noto Sans" panose="020B0502040504020204" pitchFamily="34" charset="0"/>
+              </a:rPr>
+              <a:t>draft-</a:t>
+            </a:r>
+            <a:r>
+              <a:rPr lang="en-US" i="0" u="none" strike="noStrike" dirty="0" err="1">
+                <a:solidFill>
+                  <a:srgbClr val="FF0000"/>
+                </a:solidFill>
+                <a:effectLst/>
+                <a:latin typeface="Noto Sans" panose="020B0502040504020204" pitchFamily="34" charset="0"/>
+                <a:ea typeface="Noto Sans" panose="020B0502040504020204" pitchFamily="34" charset="0"/>
+                <a:cs typeface="Noto Sans" panose="020B0502040504020204" pitchFamily="34" charset="0"/>
+              </a:rPr>
+              <a:t>tschofenig</a:t>
+            </a:r>
+            <a:r>
+              <a:rPr lang="en-US" i="0" u="none" strike="noStrike" dirty="0">
+                <a:solidFill>
+                  <a:srgbClr val="FF0000"/>
+                </a:solidFill>
+                <a:effectLst/>
+                <a:latin typeface="Noto Sans" panose="020B0502040504020204" pitchFamily="34" charset="0"/>
+                <a:ea typeface="Noto Sans" panose="020B0502040504020204" pitchFamily="34" charset="0"/>
+                <a:cs typeface="Noto Sans" panose="020B0502040504020204" pitchFamily="34" charset="0"/>
+              </a:rPr>
+              <a:t>-</a:t>
+            </a:r>
+            <a:r>
+              <a:rPr lang="en-US" i="0" u="none" strike="noStrike" dirty="0" err="1">
+                <a:solidFill>
+                  <a:srgbClr val="FF0000"/>
+                </a:solidFill>
+                <a:effectLst/>
+                <a:latin typeface="Noto Sans" panose="020B0502040504020204" pitchFamily="34" charset="0"/>
+                <a:ea typeface="Noto Sans" panose="020B0502040504020204" pitchFamily="34" charset="0"/>
+                <a:cs typeface="Noto Sans" panose="020B0502040504020204" pitchFamily="34" charset="0"/>
+              </a:rPr>
+              <a:t>tls</a:t>
+            </a:r>
+            <a:r>
+              <a:rPr lang="en-US" i="0" u="none" strike="noStrike" dirty="0">
+                <a:solidFill>
+                  <a:srgbClr val="FF0000"/>
+                </a:solidFill>
+                <a:effectLst/>
+                <a:latin typeface="Noto Sans" panose="020B0502040504020204" pitchFamily="34" charset="0"/>
+                <a:ea typeface="Noto Sans" panose="020B0502040504020204" pitchFamily="34" charset="0"/>
+                <a:cs typeface="Noto Sans" panose="020B0502040504020204" pitchFamily="34" charset="0"/>
+              </a:rPr>
+              <a:t>-extended-key-update</a:t>
+            </a:r>
+          </a:p>
+          <a:p>
+            <a:r>
+              <a:rPr lang="en-US" b="0" i="0" u="none" strike="noStrike" dirty="0">
+                <a:solidFill>
+                  <a:srgbClr val="222222"/>
+                </a:solidFill>
+                <a:effectLst/>
+                <a:latin typeface="Noto Sans" panose="020B0502040504020204" pitchFamily="34" charset="0"/>
+              </a:rPr>
+              <a:t>Availability</a:t>
+            </a:r>
+          </a:p>
+          <a:p>
+            <a:pPr lvl="1"/>
+            <a:r>
+              <a:rPr lang="en-US" dirty="0">
+                <a:solidFill>
+                  <a:srgbClr val="222222"/>
+                </a:solidFill>
+                <a:latin typeface="Noto Sans" panose="020B0502040504020204" pitchFamily="34" charset="0"/>
+              </a:rPr>
+              <a:t>Replay or injection must not </a:t>
+            </a:r>
+            <a:r>
+              <a:rPr lang="en-US" b="0" i="0" u="none" strike="noStrike" dirty="0">
+                <a:solidFill>
+                  <a:srgbClr val="222222"/>
+                </a:solidFill>
+                <a:effectLst/>
+                <a:latin typeface="Noto Sans" panose="020B0502040504020204" pitchFamily="34" charset="0"/>
+              </a:rPr>
+              <a:t>affect the availability of the association. (MUST)</a:t>
+            </a:r>
+            <a:br>
+              <a:rPr lang="en-US" b="0" i="0" u="none" strike="noStrike" dirty="0">
+                <a:solidFill>
+                  <a:srgbClr val="222222"/>
+                </a:solidFill>
+                <a:effectLst/>
+                <a:latin typeface="Noto Sans" panose="020B0502040504020204" pitchFamily="34" charset="0"/>
+              </a:rPr>
+            </a:br>
+            <a:r>
+              <a:rPr lang="en-US" b="0" i="0" u="none" strike="noStrike" dirty="0">
+                <a:solidFill>
+                  <a:srgbClr val="FF0000"/>
+                </a:solidFill>
+                <a:effectLst/>
+                <a:latin typeface="Noto Sans" panose="020B0502040504020204" pitchFamily="34" charset="0"/>
+              </a:rPr>
+              <a:t>Done using SCTP AUTH.</a:t>
+            </a:r>
+            <a:endParaRPr lang="en-US" b="0" i="0" u="none" strike="noStrike" dirty="0">
+              <a:solidFill>
+                <a:srgbClr val="222222"/>
+              </a:solidFill>
+              <a:effectLst/>
+              <a:latin typeface="Noto Sans" panose="020B0502040504020204" pitchFamily="34" charset="0"/>
+            </a:endParaRPr>
+          </a:p>
+          <a:p>
+            <a:pPr lvl="1"/>
+            <a:r>
+              <a:rPr lang="en-US" b="0" i="0" u="none" strike="noStrike" dirty="0">
+                <a:solidFill>
+                  <a:srgbClr val="222222"/>
+                </a:solidFill>
+                <a:effectLst/>
+                <a:latin typeface="Noto Sans" panose="020B0502040504020204" pitchFamily="34" charset="0"/>
+              </a:rPr>
+              <a:t>In particular, the SCTP restart procedure must not allow to take over an SCTP association by an attacker. (MUST)</a:t>
+            </a:r>
+            <a:br>
+              <a:rPr lang="en-US" b="0" i="0" u="none" strike="noStrike" dirty="0">
+                <a:solidFill>
+                  <a:srgbClr val="222222"/>
+                </a:solidFill>
+                <a:effectLst/>
+                <a:latin typeface="Noto Sans" panose="020B0502040504020204" pitchFamily="34" charset="0"/>
+              </a:rPr>
+            </a:br>
+            <a:r>
+              <a:rPr lang="en-US" dirty="0">
+                <a:solidFill>
+                  <a:srgbClr val="FF0000"/>
+                </a:solidFill>
+                <a:latin typeface="Noto Sans" panose="020B0502040504020204" pitchFamily="34" charset="0"/>
+              </a:rPr>
+              <a:t>Done using SCTP AUTH or draft-</a:t>
+            </a:r>
+            <a:r>
+              <a:rPr lang="en-US" dirty="0" err="1">
+                <a:solidFill>
+                  <a:srgbClr val="FF0000"/>
+                </a:solidFill>
+                <a:latin typeface="Noto Sans" panose="020B0502040504020204" pitchFamily="34" charset="0"/>
+              </a:rPr>
+              <a:t>tuexen</a:t>
+            </a:r>
+            <a:r>
+              <a:rPr lang="en-US" dirty="0">
+                <a:solidFill>
+                  <a:srgbClr val="FF0000"/>
+                </a:solidFill>
+                <a:latin typeface="Noto Sans" panose="020B0502040504020204" pitchFamily="34" charset="0"/>
+              </a:rPr>
+              <a:t>-</a:t>
+            </a:r>
+            <a:r>
+              <a:rPr lang="en-US" dirty="0" err="1">
+                <a:solidFill>
+                  <a:srgbClr val="FF0000"/>
+                </a:solidFill>
+                <a:latin typeface="Noto Sans" panose="020B0502040504020204" pitchFamily="34" charset="0"/>
+              </a:rPr>
+              <a:t>tsvwg</a:t>
+            </a:r>
+            <a:r>
+              <a:rPr lang="en-US" dirty="0">
+                <a:solidFill>
+                  <a:srgbClr val="FF0000"/>
+                </a:solidFill>
+                <a:latin typeface="Noto Sans" panose="020B0502040504020204" pitchFamily="34" charset="0"/>
+              </a:rPr>
+              <a:t>-</a:t>
+            </a:r>
+            <a:r>
+              <a:rPr lang="en-US" dirty="0" err="1">
+                <a:solidFill>
+                  <a:srgbClr val="FF0000"/>
+                </a:solidFill>
+                <a:latin typeface="Noto Sans" panose="020B0502040504020204" pitchFamily="34" charset="0"/>
+              </a:rPr>
+              <a:t>sctp</a:t>
+            </a:r>
+            <a:r>
+              <a:rPr lang="en-US" dirty="0">
+                <a:solidFill>
+                  <a:srgbClr val="FF0000"/>
+                </a:solidFill>
+                <a:latin typeface="Noto Sans" panose="020B0502040504020204" pitchFamily="34" charset="0"/>
+              </a:rPr>
+              <a:t>-restart-token (to be submitted).</a:t>
+            </a:r>
+            <a:endParaRPr lang="en-US" b="0" i="0" u="none" strike="noStrike" dirty="0">
+              <a:solidFill>
+                <a:srgbClr val="222222"/>
+              </a:solidFill>
+              <a:effectLst/>
+              <a:latin typeface="Noto Sans" panose="020B0502040504020204" pitchFamily="34" charset="0"/>
+            </a:endParaRPr>
+          </a:p>
+        </p:txBody>
+      </p:sp>
+      <p:sp>
+        <p:nvSpPr>
+          <p:cNvPr id="4" name="Slide Number Placeholder 3">
+            <a:extLst>
+              <a:ext uri="{FF2B5EF4-FFF2-40B4-BE49-F238E27FC236}">
+                <a16:creationId xmlns:a16="http://schemas.microsoft.com/office/drawing/2014/main" id="{C7E87A53-2C6D-740A-9668-18465FAB97B4}"/>
+              </a:ext>
+            </a:extLst>
+          </p:cNvPr>
+          <p:cNvSpPr>
+            <a:spLocks noGrp="1"/>
+          </p:cNvSpPr>
+          <p:nvPr>
+            <p:ph type="sldNum" sz="quarter" idx="12"/>
+          </p:nvPr>
+        </p:nvSpPr>
+        <p:spPr/>
+        <p:txBody>
+          <a:bodyPr/>
+          <a:lstStyle/>
+          <a:p>
+            <a:fld id="{85EFE21A-7D36-5F4B-860F-8EDB2266837F}" type="slidenum">
+              <a:rPr lang="en-US" smtClean="0"/>
+              <a:t>5</a:t>
+            </a:fld>
+            <a:endParaRPr lang="en-US"/>
+          </a:p>
+        </p:txBody>
+      </p:sp>
+    </p:spTree>
+    <p:extLst>
+      <p:ext uri="{BB962C8B-B14F-4D97-AF65-F5344CB8AC3E}">
+        <p14:creationId xmlns:p14="http://schemas.microsoft.com/office/powerpoint/2010/main" val="3601856472"/>
+      </p:ext>
+    </p:extLst>
+  </p:cSld>
+  <p:clrMapOvr>
+    <a:masterClrMapping/>
+  </p:clrMapOvr>
+</p:sld>
+</file>
+
+<file path=ppt/slides/slide7.xml><?xml version="1.0" encoding="utf-8"?>
+<p:sld xmlns:a="http://schemas.openxmlformats.org/drawingml/2006/main" xmlns:r="http://schemas.openxmlformats.org/officeDocument/2006/relationships" xmlns:p="http://schemas.openxmlformats.org/presentationml/2006/main">
+  <p:cSld>
+    <p:spTree>
+      <p:nvGrpSpPr>
+        <p:cNvPr id="1" name=""/>
+        <p:cNvGrpSpPr/>
+        <p:nvPr/>
+      </p:nvGrpSpPr>
+      <p:grpSpPr>
+        <a:xfrm>
+          <a:off x="0" y="0"/>
+          <a:ext cx="0" cy="0"/>
+          <a:chOff x="0" y="0"/>
+          <a:chExt cx="0" cy="0"/>
+        </a:xfrm>
+      </p:grpSpPr>
+      <p:sp>
+        <p:nvSpPr>
+          <p:cNvPr id="2" name="Title 1">
+            <a:extLst>
+              <a:ext uri="{FF2B5EF4-FFF2-40B4-BE49-F238E27FC236}">
                 <a16:creationId xmlns:a16="http://schemas.microsoft.com/office/drawing/2014/main" id="{44E7BDE5-F2F0-3F35-5EFB-A213398A6B2E}"/>
               </a:ext>
             </a:extLst>
@@ -5191,7 +5373,7 @@
           <a:p>
             <a:fld id="{85EFE21A-7D36-5F4B-860F-8EDB2266837F}" type="slidenum">
               <a:rPr lang="en-US" smtClean="0"/>
-              <a:t>5</a:t>
+              <a:t>6</a:t>
             </a:fld>
             <a:endParaRPr lang="en-US"/>
           </a:p>

</xml_diff>

<commit_message>
Add reference to RFC
</commit_message>
<xml_diff>
--- a/SCTP_DTLS_REQ-matching-dtls-over-sctp-tuexen.pptx
+++ b/SCTP_DTLS_REQ-matching-dtls-over-sctp-tuexen.pptx
@@ -203,7 +203,7 @@
           <a:p>
             <a:fld id="{108AD09B-7AB8-CC42-A1BA-7C68369AC918}" type="datetimeFigureOut">
               <a:rPr lang="en-US" smtClean="0"/>
-              <a:t>12/14/23</a:t>
+              <a:t>12/15/23</a:t>
             </a:fld>
             <a:endParaRPr lang="en-US"/>
           </a:p>
@@ -617,7 +617,7 @@
           <a:p>
             <a:fld id="{A8F7BD6E-364A-514B-905D-15DBF3E67648}" type="datetime1">
               <a:rPr lang="en-US" smtClean="0"/>
-              <a:t>12/14/23</a:t>
+              <a:t>12/15/23</a:t>
             </a:fld>
             <a:endParaRPr lang="en-US"/>
           </a:p>
@@ -815,7 +815,7 @@
           <a:p>
             <a:fld id="{F61C2FBE-B8D6-D547-9282-9EC77743BC0A}" type="datetime1">
               <a:rPr lang="en-US" smtClean="0"/>
-              <a:t>12/14/23</a:t>
+              <a:t>12/15/23</a:t>
             </a:fld>
             <a:endParaRPr lang="en-US"/>
           </a:p>
@@ -1023,7 +1023,7 @@
           <a:p>
             <a:fld id="{C531A4A5-E0CC-6A44-8D5B-7470DEE9150D}" type="datetime1">
               <a:rPr lang="en-US" smtClean="0"/>
-              <a:t>12/14/23</a:t>
+              <a:t>12/15/23</a:t>
             </a:fld>
             <a:endParaRPr lang="en-US"/>
           </a:p>
@@ -1221,7 +1221,7 @@
           <a:p>
             <a:fld id="{0FD05AA0-7A0A-A240-95B0-41C4FC7FEF3F}" type="datetime1">
               <a:rPr lang="en-US" smtClean="0"/>
-              <a:t>12/14/23</a:t>
+              <a:t>12/15/23</a:t>
             </a:fld>
             <a:endParaRPr lang="en-US"/>
           </a:p>
@@ -1496,7 +1496,7 @@
           <a:p>
             <a:fld id="{492F5F67-E4E1-0B46-A541-0286580506DC}" type="datetime1">
               <a:rPr lang="en-US" smtClean="0"/>
-              <a:t>12/14/23</a:t>
+              <a:t>12/15/23</a:t>
             </a:fld>
             <a:endParaRPr lang="en-US"/>
           </a:p>
@@ -1761,7 +1761,7 @@
           <a:p>
             <a:fld id="{CD6E3338-B931-A843-9726-3D4933BBE2B6}" type="datetime1">
               <a:rPr lang="en-US" smtClean="0"/>
-              <a:t>12/14/23</a:t>
+              <a:t>12/15/23</a:t>
             </a:fld>
             <a:endParaRPr lang="en-US"/>
           </a:p>
@@ -2173,7 +2173,7 @@
           <a:p>
             <a:fld id="{998F852E-6523-104E-943C-AD0A8BADDFF7}" type="datetime1">
               <a:rPr lang="en-US" smtClean="0"/>
-              <a:t>12/14/23</a:t>
+              <a:t>12/15/23</a:t>
             </a:fld>
             <a:endParaRPr lang="en-US"/>
           </a:p>
@@ -2314,7 +2314,7 @@
           <a:p>
             <a:fld id="{00715B09-F454-1B43-BA14-0C163C35D17B}" type="datetime1">
               <a:rPr lang="en-US" smtClean="0"/>
-              <a:t>12/14/23</a:t>
+              <a:t>12/15/23</a:t>
             </a:fld>
             <a:endParaRPr lang="en-US"/>
           </a:p>
@@ -2427,7 +2427,7 @@
           <a:p>
             <a:fld id="{45D3E245-F198-854E-AE1F-11D9862087BE}" type="datetime1">
               <a:rPr lang="en-US" smtClean="0"/>
-              <a:t>12/14/23</a:t>
+              <a:t>12/15/23</a:t>
             </a:fld>
             <a:endParaRPr lang="en-US"/>
           </a:p>
@@ -2738,7 +2738,7 @@
           <a:p>
             <a:fld id="{1CDA9BB8-81E0-C14F-B5A7-21E310CC6BEA}" type="datetime1">
               <a:rPr lang="en-US" smtClean="0"/>
-              <a:t>12/14/23</a:t>
+              <a:t>12/15/23</a:t>
             </a:fld>
             <a:endParaRPr lang="en-US"/>
           </a:p>
@@ -3026,7 +3026,7 @@
           <a:p>
             <a:fld id="{35BD4846-0B22-E244-9BD2-C2A2A852C121}" type="datetime1">
               <a:rPr lang="en-US" smtClean="0"/>
-              <a:t>12/14/23</a:t>
+              <a:t>12/15/23</a:t>
             </a:fld>
             <a:endParaRPr lang="en-US"/>
           </a:p>
@@ -3267,7 +3267,7 @@
           <a:p>
             <a:fld id="{C37BE4AB-D615-A94C-AEE2-AC91B9864A50}" type="datetime1">
               <a:rPr lang="en-US" smtClean="0"/>
-              <a:t>12/14/23</a:t>
+              <a:t>12/15/23</a:t>
             </a:fld>
             <a:endParaRPr lang="en-US"/>
           </a:p>
@@ -4915,7 +4915,7 @@
                 <a:effectLst/>
                 <a:latin typeface="Noto Sans" panose="020B0502040504020204" pitchFamily="34" charset="0"/>
               </a:rPr>
-              <a:t>-post-handshake.</a:t>
+              <a:t>-post-handshake or RFC 9261.</a:t>
             </a:r>
             <a:endParaRPr lang="en-US" b="0" i="0" u="none" strike="noStrike" dirty="0">
               <a:solidFill>

</xml_diff>